<commit_message>
Update The Superhero Super Database!.pptx
</commit_message>
<xml_diff>
--- a/Powerpoint/The Superhero Super Database!.pptx
+++ b/Powerpoint/The Superhero Super Database!.pptx
@@ -7577,6 +7577,90 @@
           </a:p>
         </p:txBody>
       </p:sp>
+      <p:pic>
+        <p:nvPicPr>
+          <p:cNvPr id="1026" name="Picture 2">
+            <a:extLst>
+              <a:ext uri="{FF2B5EF4-FFF2-40B4-BE49-F238E27FC236}">
+                <a16:creationId xmlns:a16="http://schemas.microsoft.com/office/drawing/2014/main" id="{0582B1B5-B871-4404-A4C2-C15B932B93BB}"/>
+              </a:ext>
+            </a:extLst>
+          </p:cNvPr>
+          <p:cNvPicPr>
+            <a:picLocks noChangeAspect="1" noChangeArrowheads="1"/>
+          </p:cNvPicPr>
+          <p:nvPr/>
+        </p:nvPicPr>
+        <p:blipFill>
+          <a:blip r:embed="rId2">
+            <a:extLst>
+              <a:ext uri="{28A0092B-C50C-407E-A947-70E740481C1C}">
+                <a14:useLocalDpi xmlns:a14="http://schemas.microsoft.com/office/drawing/2010/main" val="0"/>
+              </a:ext>
+            </a:extLst>
+          </a:blip>
+          <a:srcRect/>
+          <a:stretch>
+            <a:fillRect/>
+          </a:stretch>
+        </p:blipFill>
+        <p:spPr bwMode="auto">
+          <a:xfrm rot="158475">
+            <a:off x="7106464" y="1288473"/>
+            <a:ext cx="3490249" cy="4281055"/>
+          </a:xfrm>
+          <a:prstGeom prst="rect">
+            <a:avLst/>
+          </a:prstGeom>
+          <a:noFill/>
+          <a:extLst>
+            <a:ext uri="{909E8E84-426E-40DD-AFC4-6F175D3DCCD1}">
+              <a14:hiddenFill xmlns:a14="http://schemas.microsoft.com/office/drawing/2010/main">
+                <a:solidFill>
+                  <a:srgbClr val="FFFFFF"/>
+                </a:solidFill>
+              </a14:hiddenFill>
+            </a:ext>
+          </a:extLst>
+        </p:spPr>
+      </p:pic>
+      <p:sp>
+        <p:nvSpPr>
+          <p:cNvPr id="3" name="TextBox 2">
+            <a:extLst>
+              <a:ext uri="{FF2B5EF4-FFF2-40B4-BE49-F238E27FC236}">
+                <a16:creationId xmlns:a16="http://schemas.microsoft.com/office/drawing/2014/main" id="{02FDD622-8444-4CF7-B574-10B2BF17B7C3}"/>
+              </a:ext>
+            </a:extLst>
+          </p:cNvPr>
+          <p:cNvSpPr txBox="1"/>
+          <p:nvPr/>
+        </p:nvSpPr>
+        <p:spPr>
+          <a:xfrm>
+            <a:off x="2325986" y="3429000"/>
+            <a:ext cx="3640740" cy="584775"/>
+          </a:xfrm>
+          <a:prstGeom prst="rect">
+            <a:avLst/>
+          </a:prstGeom>
+          <a:noFill/>
+        </p:spPr>
+        <p:txBody>
+          <a:bodyPr wrap="none" rtlCol="0">
+            <a:spAutoFit/>
+          </a:bodyPr>
+          <a:lstStyle/>
+          <a:p>
+            <a:r>
+              <a:rPr lang="en-US" sz="3200" dirty="0">
+                <a:latin typeface="Comic Book" panose="02000500000000000000" pitchFamily="2" charset="0"/>
+              </a:rPr>
+              <a:t>It just works!</a:t>
+            </a:r>
+          </a:p>
+        </p:txBody>
+      </p:sp>
     </p:spTree>
     <p:extLst>
       <p:ext uri="{BB962C8B-B14F-4D97-AF65-F5344CB8AC3E}">
@@ -7633,7 +7717,7 @@
               <a:rPr lang="en-US" sz="3200" dirty="0">
                 <a:latin typeface="Comic Book" panose="02000500000000000000" pitchFamily="2" charset="0"/>
               </a:rPr>
-              <a:t>FLASK &amp; JAVASCRIPT</a:t>
+              <a:t>JAVASCRIPT</a:t>
             </a:r>
           </a:p>
         </p:txBody>

</xml_diff>

<commit_message>
ppt update picture added
</commit_message>
<xml_diff>
--- a/Powerpoint/The Superhero Super Database!.pptx
+++ b/Powerpoint/The Superhero Super Database!.pptx
@@ -6698,6 +6698,42 @@
           </a:p>
         </p:txBody>
       </p:sp>
+      <p:pic>
+        <p:nvPicPr>
+          <p:cNvPr id="10" name="Picture 9" descr="A close up of a logo&#10;&#10;Description automatically generated">
+            <a:extLst>
+              <a:ext uri="{FF2B5EF4-FFF2-40B4-BE49-F238E27FC236}">
+                <a16:creationId xmlns:a16="http://schemas.microsoft.com/office/drawing/2014/main" id="{C2BE14CC-E190-4DC2-A05D-0E1FBEA895AF}"/>
+              </a:ext>
+            </a:extLst>
+          </p:cNvPr>
+          <p:cNvPicPr>
+            <a:picLocks noChangeAspect="1"/>
+          </p:cNvPicPr>
+          <p:nvPr/>
+        </p:nvPicPr>
+        <p:blipFill>
+          <a:blip r:embed="rId2">
+            <a:extLst>
+              <a:ext uri="{28A0092B-C50C-407E-A947-70E740481C1C}">
+                <a14:useLocalDpi xmlns:a14="http://schemas.microsoft.com/office/drawing/2010/main" val="0"/>
+              </a:ext>
+            </a:extLst>
+          </a:blip>
+          <a:stretch>
+            <a:fillRect/>
+          </a:stretch>
+        </p:blipFill>
+        <p:spPr>
+          <a:xfrm>
+            <a:off x="10690324" y="5593278"/>
+            <a:ext cx="1501676" cy="1501676"/>
+          </a:xfrm>
+          <a:prstGeom prst="rect">
+            <a:avLst/>
+          </a:prstGeom>
+        </p:spPr>
+      </p:pic>
     </p:spTree>
     <p:extLst>
       <p:ext uri="{BB962C8B-B14F-4D97-AF65-F5344CB8AC3E}">

</xml_diff>